<commit_message>
Poster and finishing touches
</commit_message>
<xml_diff>
--- a/Пенокартон_HADIS.pptx
+++ b/Пенокартон_HADIS.pptx
@@ -6,6 +6,7 @@
   </p:sldMasterIdLst>
   <p:sldIdLst>
     <p:sldId id="256" r:id="rId2"/>
+    <p:sldId id="257" r:id="rId3"/>
   </p:sldIdLst>
   <p:sldSz cx="15119350" cy="21383625"/>
   <p:notesSz cx="6858000" cy="9144000"/>
@@ -5935,7 +5936,7 @@
         </p:nvSpPr>
         <p:spPr bwMode="auto">
           <a:xfrm>
-            <a:off x="457200" y="2788272"/>
+            <a:off x="457199" y="2704129"/>
             <a:ext cx="14204950" cy="1277938"/>
           </a:xfrm>
           <a:prstGeom prst="rect">
@@ -6038,7 +6039,52 @@
                 </a:solidFill>
                 <a:latin typeface="Sofia Sans Cond" panose="020B0503060000020004" pitchFamily="34" charset="0"/>
               </a:rPr>
-              <a:t>	Играта е разработена от:</a:t>
+              <a:t>	</a:t>
+            </a:r>
+            <a:r>
+              <a:rPr lang="bg-BG" sz="2800" dirty="0" smtClean="0">
+                <a:solidFill>
+                  <a:srgbClr val="FFFF00"/>
+                </a:solidFill>
+                <a:latin typeface="Sofia Sans Cond" panose="020B0503060000020004" pitchFamily="34" charset="0"/>
+              </a:rPr>
+              <a:t>Проектът</a:t>
+            </a:r>
+            <a:r>
+              <a:rPr lang="bg-BG" sz="2800" dirty="0" smtClean="0">
+                <a:solidFill>
+                  <a:srgbClr val="FFFF00"/>
+                </a:solidFill>
+                <a:latin typeface="Sofia Sans Cond" panose="020B0503060000020004" pitchFamily="34" charset="0"/>
+              </a:rPr>
+              <a:t> </a:t>
+            </a:r>
+            <a:r>
+              <a:rPr lang="bg-BG" sz="2800" dirty="0" smtClean="0">
+                <a:solidFill>
+                  <a:srgbClr val="FFFF00"/>
+                </a:solidFill>
+                <a:latin typeface="Sofia Sans Cond" panose="020B0503060000020004" pitchFamily="34" charset="0"/>
+              </a:rPr>
+              <a:t>е </a:t>
+            </a:r>
+            <a:r>
+              <a:rPr lang="bg-BG" sz="2800" dirty="0" smtClean="0">
+                <a:solidFill>
+                  <a:srgbClr val="FFFF00"/>
+                </a:solidFill>
+                <a:latin typeface="Sofia Sans Cond" panose="020B0503060000020004" pitchFamily="34" charset="0"/>
+              </a:rPr>
+              <a:t>разработен </a:t>
+            </a:r>
+            <a:r>
+              <a:rPr lang="bg-BG" sz="2800" dirty="0" smtClean="0">
+                <a:solidFill>
+                  <a:srgbClr val="FFFF00"/>
+                </a:solidFill>
+                <a:latin typeface="Sofia Sans Cond" panose="020B0503060000020004" pitchFamily="34" charset="0"/>
+              </a:rPr>
+              <a:t>от:</a:t>
             </a:r>
           </a:p>
           <a:p>
@@ -6594,56 +6640,6 @@
               </a:solidFill>
               <a:latin typeface="Sofia Sans Cond" panose="020B0503060000020004" pitchFamily="34" charset="0"/>
             </a:endParaRPr>
-          </a:p>
-        </p:txBody>
-      </p:sp>
-      <p:sp>
-        <p:nvSpPr>
-          <p:cNvPr id="15" name="Rectangle 5"/>
-          <p:cNvSpPr>
-            <a:spLocks noChangeArrowheads="1"/>
-          </p:cNvSpPr>
-          <p:nvPr/>
-        </p:nvSpPr>
-        <p:spPr bwMode="auto">
-          <a:xfrm>
-            <a:off x="7559675" y="8558270"/>
-            <a:ext cx="7102800" cy="4266000"/>
-          </a:xfrm>
-          <a:prstGeom prst="rect">
-            <a:avLst/>
-          </a:prstGeom>
-          <a:solidFill>
-            <a:srgbClr val="00B050"/>
-          </a:solidFill>
-          <a:ln w="3175" algn="ctr">
-            <a:noFill/>
-            <a:miter lim="800000"/>
-            <a:headEnd/>
-            <a:tailEnd/>
-          </a:ln>
-          <a:effectLst/>
-          <a:extLst>
-            <a:ext uri="{AF507438-7753-43E0-B8FC-AC1667EBCBE1}">
-              <a14:hiddenEffects xmlns:a14="http://schemas.microsoft.com/office/drawing/2010/main">
-                <a:effectLst>
-                  <a:outerShdw dist="35921" dir="2700000" algn="ctr" rotWithShape="0">
-                    <a:srgbClr val="000000"/>
-                  </a:outerShdw>
-                </a:effectLst>
-              </a14:hiddenEffects>
-            </a:ext>
-          </a:extLst>
-        </p:spPr>
-        <p:txBody>
-          <a:bodyPr vert="horz" wrap="square" lIns="36576" tIns="36576" rIns="36576" bIns="36576" numCol="1" anchor="t" anchorCtr="0" compatLnSpc="1">
-            <a:prstTxWarp prst="textNoShape">
-              <a:avLst/>
-            </a:prstTxWarp>
-          </a:bodyPr>
-          <a:lstStyle/>
-          <a:p>
-            <a:endParaRPr lang="bg-BG"/>
           </a:p>
         </p:txBody>
       </p:sp>
@@ -6931,13 +6927,103 @@
         </p:blipFill>
         <p:spPr>
           <a:xfrm>
-            <a:off x="7559675" y="4507391"/>
+            <a:off x="7679988" y="4509289"/>
             <a:ext cx="7102800" cy="3837384"/>
           </a:xfrm>
           <a:prstGeom prst="rect">
             <a:avLst/>
           </a:prstGeom>
+          <a:ln>
+            <a:solidFill>
+              <a:srgbClr val="FFFF00"/>
+            </a:solidFill>
+          </a:ln>
           <a:effectLst/>
+        </p:spPr>
+      </p:pic>
+      <p:pic>
+        <p:nvPicPr>
+          <p:cNvPr id="19" name="Picture 2" descr="https://cdn.discordapp.com/attachments/960191998462165033/961419990119088128/GolemoPate.png"/>
+          <p:cNvPicPr>
+            <a:picLocks noChangeAspect="1" noChangeArrowheads="1"/>
+          </p:cNvPicPr>
+          <p:nvPr/>
+        </p:nvPicPr>
+        <p:blipFill rotWithShape="1">
+          <a:blip r:embed="rId15" cstate="print">
+            <a:extLst>
+              <a:ext uri="{28A0092B-C50C-407E-A947-70E740481C1C}">
+                <a14:useLocalDpi xmlns:a14="http://schemas.microsoft.com/office/drawing/2010/main" val="0"/>
+              </a:ext>
+            </a:extLst>
+          </a:blip>
+          <a:srcRect l="867" t="847" r="1095" b="815"/>
+          <a:stretch/>
+        </p:blipFill>
+        <p:spPr bwMode="auto">
+          <a:xfrm rot="752525">
+            <a:off x="3961060" y="3191456"/>
+            <a:ext cx="629989" cy="654715"/>
+          </a:xfrm>
+          <a:prstGeom prst="rect">
+            <a:avLst/>
+          </a:prstGeom>
+          <a:noFill/>
+          <a:extLst>
+            <a:ext uri="{909E8E84-426E-40DD-AFC4-6F175D3DCCD1}">
+              <a14:hiddenFill xmlns:a14="http://schemas.microsoft.com/office/drawing/2010/main">
+                <a:solidFill>
+                  <a:srgbClr val="FFFFFF"/>
+                </a:solidFill>
+              </a14:hiddenFill>
+            </a:ext>
+          </a:extLst>
+        </p:spPr>
+      </p:pic>
+      <p:pic>
+        <p:nvPicPr>
+          <p:cNvPr id="20" name="Picture 4" descr="https://cdn.discordapp.com/attachments/960191998462165033/961423334522896414/unknown.png"/>
+          <p:cNvPicPr>
+            <a:picLocks noChangeAspect="1" noChangeArrowheads="1"/>
+          </p:cNvPicPr>
+          <p:nvPr/>
+        </p:nvPicPr>
+        <p:blipFill>
+          <a:blip r:embed="rId16">
+            <a:extLst>
+              <a:ext uri="{28A0092B-C50C-407E-A947-70E740481C1C}">
+                <a14:useLocalDpi xmlns:a14="http://schemas.microsoft.com/office/drawing/2010/main" val="0"/>
+              </a:ext>
+            </a:extLst>
+          </a:blip>
+          <a:srcRect/>
+          <a:stretch>
+            <a:fillRect/>
+          </a:stretch>
+        </p:blipFill>
+        <p:spPr bwMode="auto">
+          <a:xfrm>
+            <a:off x="7679988" y="8673463"/>
+            <a:ext cx="7089680" cy="4034295"/>
+          </a:xfrm>
+          <a:prstGeom prst="rect">
+            <a:avLst/>
+          </a:prstGeom>
+          <a:noFill/>
+          <a:ln>
+            <a:solidFill>
+              <a:srgbClr val="FFFF00"/>
+            </a:solidFill>
+          </a:ln>
+          <a:extLst>
+            <a:ext uri="{909E8E84-426E-40DD-AFC4-6F175D3DCCD1}">
+              <a14:hiddenFill xmlns:a14="http://schemas.microsoft.com/office/drawing/2010/main">
+                <a:solidFill>
+                  <a:srgbClr val="FFFFFF"/>
+                </a:solidFill>
+              </a14:hiddenFill>
+            </a:ext>
+          </a:extLst>
         </p:spPr>
       </p:pic>
     </p:spTree>
@@ -6950,6 +7036,1552 @@
   <p:clrMapOvr>
     <a:masterClrMapping/>
   </p:clrMapOvr>
+  <p:timing>
+    <p:tnLst>
+      <p:par>
+        <p:cTn id="1" dur="indefinite" restart="never" nodeType="tmRoot"/>
+      </p:par>
+    </p:tnLst>
+  </p:timing>
+</p:sld>
+</file>
+
+<file path=ppt/slides/slide2.xml><?xml version="1.0" encoding="utf-8"?>
+<p:sld xmlns:a="http://schemas.openxmlformats.org/drawingml/2006/main" xmlns:r="http://schemas.openxmlformats.org/officeDocument/2006/relationships" xmlns:p="http://schemas.openxmlformats.org/presentationml/2006/main">
+  <p:cSld>
+    <p:spTree>
+      <p:nvGrpSpPr>
+        <p:cNvPr id="1" name=""/>
+        <p:cNvGrpSpPr/>
+        <p:nvPr/>
+      </p:nvGrpSpPr>
+      <p:grpSpPr>
+        <a:xfrm>
+          <a:off x="0" y="0"/>
+          <a:ext cx="0" cy="0"/>
+          <a:chOff x="0" y="0"/>
+          <a:chExt cx="0" cy="0"/>
+        </a:xfrm>
+      </p:grpSpPr>
+      <p:pic>
+        <p:nvPicPr>
+          <p:cNvPr id="2" name="Picture 1"/>
+          <p:cNvPicPr>
+            <a:picLocks noChangeAspect="1"/>
+          </p:cNvPicPr>
+          <p:nvPr/>
+        </p:nvPicPr>
+        <p:blipFill rotWithShape="1">
+          <a:blip r:embed="rId2">
+            <a:extLst>
+              <a:ext uri="{28A0092B-C50C-407E-A947-70E740481C1C}">
+                <a14:useLocalDpi xmlns:a14="http://schemas.microsoft.com/office/drawing/2010/main" val="0"/>
+              </a:ext>
+            </a:extLst>
+          </a:blip>
+          <a:srcRect l="9616" r="9616"/>
+          <a:stretch/>
+        </p:blipFill>
+        <p:spPr>
+          <a:xfrm rot="5400000">
+            <a:off x="-3132138" y="3132138"/>
+            <a:ext cx="21383625" cy="15119348"/>
+          </a:xfrm>
+          <a:prstGeom prst="rect">
+            <a:avLst/>
+          </a:prstGeom>
+          <a:blipFill dpi="0" rotWithShape="1">
+            <a:blip r:embed="rId3"/>
+            <a:srcRect/>
+            <a:stretch>
+              <a:fillRect/>
+            </a:stretch>
+          </a:blipFill>
+          <a:ln>
+            <a:noFill/>
+          </a:ln>
+        </p:spPr>
+      </p:pic>
+      <p:pic>
+        <p:nvPicPr>
+          <p:cNvPr id="16" name="Picture 9" descr="https://elsys-bg.org/tues30/img/LogoTU-BG-blue.png"/>
+          <p:cNvPicPr>
+            <a:picLocks noChangeAspect="1" noChangeArrowheads="1"/>
+          </p:cNvPicPr>
+          <p:nvPr/>
+        </p:nvPicPr>
+        <p:blipFill>
+          <a:blip r:embed="rId4" cstate="print">
+            <a:extLst>
+              <a:ext uri="{BEBA8EAE-BF5A-486C-A8C5-ECC9F3942E4B}">
+                <a14:imgProps xmlns:a14="http://schemas.microsoft.com/office/drawing/2010/main">
+                  <a14:imgLayer r:embed="rId5">
+                    <a14:imgEffect>
+                      <a14:brightnessContrast bright="40000" contrast="40000"/>
+                    </a14:imgEffect>
+                  </a14:imgLayer>
+                </a14:imgProps>
+              </a:ext>
+              <a:ext uri="{28A0092B-C50C-407E-A947-70E740481C1C}">
+                <a14:useLocalDpi xmlns:a14="http://schemas.microsoft.com/office/drawing/2010/main" val="0"/>
+              </a:ext>
+            </a:extLst>
+          </a:blip>
+          <a:srcRect/>
+          <a:stretch>
+            <a:fillRect/>
+          </a:stretch>
+        </p:blipFill>
+        <p:spPr bwMode="auto">
+          <a:xfrm>
+            <a:off x="12111447" y="449719"/>
+            <a:ext cx="2550702" cy="2559600"/>
+          </a:xfrm>
+          <a:prstGeom prst="rect">
+            <a:avLst/>
+          </a:prstGeom>
+          <a:noFill/>
+          <a:extLst>
+            <a:ext uri="{909E8E84-426E-40DD-AFC4-6F175D3DCCD1}">
+              <a14:hiddenFill xmlns:a14="http://schemas.microsoft.com/office/drawing/2010/main">
+                <a:solidFill>
+                  <a:srgbClr val="FFFFFF"/>
+                </a:solidFill>
+              </a14:hiddenFill>
+            </a:ext>
+          </a:extLst>
+        </p:spPr>
+      </p:pic>
+      <p:sp>
+        <p:nvSpPr>
+          <p:cNvPr id="19" name="Rectangle 18"/>
+          <p:cNvSpPr/>
+          <p:nvPr/>
+        </p:nvSpPr>
+        <p:spPr>
+          <a:xfrm>
+            <a:off x="457199" y="3864264"/>
+            <a:ext cx="7102477" cy="3416320"/>
+          </a:xfrm>
+          <a:prstGeom prst="rect">
+            <a:avLst/>
+          </a:prstGeom>
+        </p:spPr>
+        <p:txBody>
+          <a:bodyPr wrap="square">
+            <a:spAutoFit/>
+          </a:bodyPr>
+          <a:lstStyle/>
+          <a:p>
+            <a:r>
+              <a:rPr lang="en-US" sz="4800" dirty="0" smtClean="0">
+                <a:solidFill>
+                  <a:srgbClr val="FFFF00"/>
+                </a:solidFill>
+                <a:latin typeface="Sofia Sans Cond" panose="020B0503060000020004" pitchFamily="34" charset="0"/>
+              </a:rPr>
+              <a:t>	</a:t>
+            </a:r>
+            <a:r>
+              <a:rPr lang="bg-BG" sz="4800" dirty="0" smtClean="0">
+                <a:solidFill>
+                  <a:srgbClr val="FFFF00"/>
+                </a:solidFill>
+                <a:latin typeface="Sofia Sans Cond" panose="020B0503060000020004" pitchFamily="34" charset="0"/>
+              </a:rPr>
+              <a:t>Какво </a:t>
+            </a:r>
+            <a:r>
+              <a:rPr lang="bg-BG" sz="4800" dirty="0">
+                <a:solidFill>
+                  <a:srgbClr val="FFFF00"/>
+                </a:solidFill>
+                <a:latin typeface="Sofia Sans Cond" panose="020B0503060000020004" pitchFamily="34" charset="0"/>
+              </a:rPr>
+              <a:t>е </a:t>
+            </a:r>
+            <a:r>
+              <a:rPr lang="en-US" sz="4800" dirty="0">
+                <a:solidFill>
+                  <a:srgbClr val="FFFF00"/>
+                </a:solidFill>
+                <a:latin typeface="Sofia Sans Cond" panose="020B0503060000020004" pitchFamily="34" charset="0"/>
+              </a:rPr>
+              <a:t>HADIS?</a:t>
+            </a:r>
+            <a:endParaRPr lang="bg-BG" sz="4800" dirty="0">
+              <a:solidFill>
+                <a:srgbClr val="FFFF00"/>
+              </a:solidFill>
+              <a:latin typeface="Sofia Sans Cond" panose="020B0503060000020004" pitchFamily="34" charset="0"/>
+            </a:endParaRPr>
+          </a:p>
+          <a:p>
+            <a:pPr marL="1143000" lvl="1" indent="-685800">
+              <a:buBlip>
+                <a:blip r:embed="rId6"/>
+              </a:buBlip>
+            </a:pPr>
+            <a:endParaRPr lang="bg-BG" sz="2400" dirty="0">
+              <a:solidFill>
+                <a:srgbClr val="FFFF00"/>
+              </a:solidFill>
+              <a:latin typeface="Sofia Sans Cond" panose="020B0503060000020004" pitchFamily="34" charset="0"/>
+            </a:endParaRPr>
+          </a:p>
+          <a:p>
+            <a:pPr lvl="1"/>
+            <a:r>
+              <a:rPr lang="en-US" sz="2400" dirty="0">
+                <a:solidFill>
+                  <a:srgbClr val="FFFF00"/>
+                </a:solidFill>
+                <a:latin typeface="Sofia Sans Cond" panose="020B0503060000020004" pitchFamily="34" charset="0"/>
+              </a:rPr>
+              <a:t>Hunt A Duck In Space </a:t>
+            </a:r>
+            <a:r>
+              <a:rPr lang="bg-BG" sz="2400" dirty="0">
+                <a:solidFill>
+                  <a:srgbClr val="FFFF00"/>
+                </a:solidFill>
+                <a:latin typeface="Sofia Sans Cond" panose="020B0503060000020004" pitchFamily="34" charset="0"/>
+              </a:rPr>
+              <a:t>е игра, в която се намираш на космически кораб. Целта е с лазер да улавяш космическите патици, които прелитат покрай теб, и да ги събираш в кош. Различните патици носят различен брой точки. В играта няма различни нива, но на всяка минута резултатът ти се записва и започва нов рунд.</a:t>
+            </a:r>
+          </a:p>
+        </p:txBody>
+      </p:sp>
+      <p:sp>
+        <p:nvSpPr>
+          <p:cNvPr id="20" name="Rectangle 19"/>
+          <p:cNvSpPr/>
+          <p:nvPr/>
+        </p:nvSpPr>
+        <p:spPr>
+          <a:xfrm>
+            <a:off x="7559674" y="3543086"/>
+            <a:ext cx="7102475" cy="4062651"/>
+          </a:xfrm>
+          <a:prstGeom prst="rect">
+            <a:avLst/>
+          </a:prstGeom>
+          <a:noFill/>
+        </p:spPr>
+        <p:txBody>
+          <a:bodyPr wrap="square">
+            <a:spAutoFit/>
+          </a:bodyPr>
+          <a:lstStyle/>
+          <a:p>
+            <a:r>
+              <a:rPr lang="en-US" sz="4800" dirty="0" smtClean="0">
+                <a:solidFill>
+                  <a:srgbClr val="FFFF00"/>
+                </a:solidFill>
+                <a:latin typeface="Sofia Sans Cond" panose="020B0503060000020004" pitchFamily="34" charset="0"/>
+              </a:rPr>
+              <a:t>	</a:t>
+            </a:r>
+            <a:r>
+              <a:rPr lang="bg-BG" sz="4800" dirty="0" smtClean="0">
+                <a:solidFill>
+                  <a:srgbClr val="FFFF00"/>
+                </a:solidFill>
+                <a:latin typeface="Sofia Sans Cond" panose="020B0503060000020004" pitchFamily="34" charset="0"/>
+              </a:rPr>
+              <a:t>Как </a:t>
+            </a:r>
+            <a:r>
+              <a:rPr lang="bg-BG" sz="4800" dirty="0">
+                <a:solidFill>
+                  <a:srgbClr val="FFFF00"/>
+                </a:solidFill>
+                <a:latin typeface="Sofia Sans Cond" panose="020B0503060000020004" pitchFamily="34" charset="0"/>
+              </a:rPr>
+              <a:t>да играем?</a:t>
+            </a:r>
+          </a:p>
+          <a:p>
+            <a:endParaRPr lang="bg-BG" dirty="0">
+              <a:solidFill>
+                <a:srgbClr val="FFFF00"/>
+              </a:solidFill>
+              <a:latin typeface="Sofia Sans Cond" panose="020B0503060000020004" pitchFamily="34" charset="0"/>
+            </a:endParaRPr>
+          </a:p>
+          <a:p>
+            <a:r>
+              <a:rPr lang="bg-BG" dirty="0">
+                <a:solidFill>
+                  <a:srgbClr val="FFFF00"/>
+                </a:solidFill>
+                <a:latin typeface="Sofia Sans Cond" panose="020B0503060000020004" pitchFamily="34" charset="0"/>
+              </a:rPr>
+              <a:t>	</a:t>
+            </a:r>
+            <a:r>
+              <a:rPr lang="bg-BG" sz="2400" dirty="0">
+                <a:solidFill>
+                  <a:srgbClr val="FFFF00"/>
+                </a:solidFill>
+                <a:latin typeface="Sofia Sans Cond" panose="020B0503060000020004" pitchFamily="34" charset="0"/>
+              </a:rPr>
+              <a:t>За момента играта е налична само на нашите компютри, </a:t>
+            </a:r>
+            <a:r>
+              <a:rPr lang="en-US" sz="2400" dirty="0" smtClean="0">
+                <a:solidFill>
+                  <a:srgbClr val="FFFF00"/>
+                </a:solidFill>
+                <a:latin typeface="Sofia Sans Cond" panose="020B0503060000020004" pitchFamily="34" charset="0"/>
+              </a:rPr>
+              <a:t>	</a:t>
+            </a:r>
+            <a:r>
+              <a:rPr lang="bg-BG" sz="2400" dirty="0" smtClean="0">
+                <a:solidFill>
+                  <a:srgbClr val="FFFF00"/>
+                </a:solidFill>
+                <a:latin typeface="Sofia Sans Cond" panose="020B0503060000020004" pitchFamily="34" charset="0"/>
+              </a:rPr>
+              <a:t>под формата </a:t>
+            </a:r>
+            <a:r>
+              <a:rPr lang="bg-BG" sz="2400" dirty="0">
+                <a:solidFill>
+                  <a:srgbClr val="FFFF00"/>
+                </a:solidFill>
+                <a:latin typeface="Sofia Sans Cond" panose="020B0503060000020004" pitchFamily="34" charset="0"/>
+              </a:rPr>
+              <a:t>на демонстрация – още има неща, които да </a:t>
+            </a:r>
+            <a:r>
+              <a:rPr lang="en-US" sz="2400" dirty="0" smtClean="0">
+                <a:solidFill>
+                  <a:srgbClr val="FFFF00"/>
+                </a:solidFill>
+                <a:latin typeface="Sofia Sans Cond" panose="020B0503060000020004" pitchFamily="34" charset="0"/>
+              </a:rPr>
+              <a:t>	</a:t>
+            </a:r>
+            <a:r>
+              <a:rPr lang="bg-BG" sz="2400" dirty="0" smtClean="0">
+                <a:solidFill>
+                  <a:srgbClr val="FFFF00"/>
+                </a:solidFill>
+                <a:latin typeface="Sofia Sans Cond" panose="020B0503060000020004" pitchFamily="34" charset="0"/>
+              </a:rPr>
+              <a:t>се доизпипат</a:t>
+            </a:r>
+            <a:r>
+              <a:rPr lang="bg-BG" sz="2400" dirty="0">
+                <a:solidFill>
+                  <a:srgbClr val="FFFF00"/>
+                </a:solidFill>
+                <a:latin typeface="Sofia Sans Cond" panose="020B0503060000020004" pitchFamily="34" charset="0"/>
+              </a:rPr>
+              <a:t>, преди да я пуснем в Интернет.</a:t>
+            </a:r>
+          </a:p>
+          <a:p>
+            <a:r>
+              <a:rPr lang="bg-BG" sz="2400" dirty="0">
+                <a:solidFill>
+                  <a:srgbClr val="FFFF00"/>
+                </a:solidFill>
+                <a:latin typeface="Sofia Sans Cond" panose="020B0503060000020004" pitchFamily="34" charset="0"/>
+              </a:rPr>
+              <a:t>	С мишката движиш лазера. Няма нужда да се натиска </a:t>
+            </a:r>
+            <a:r>
+              <a:rPr lang="en-US" sz="2400" dirty="0" smtClean="0">
+                <a:solidFill>
+                  <a:srgbClr val="FFFF00"/>
+                </a:solidFill>
+                <a:latin typeface="Sofia Sans Cond" panose="020B0503060000020004" pitchFamily="34" charset="0"/>
+              </a:rPr>
+              <a:t>	</a:t>
+            </a:r>
+            <a:r>
+              <a:rPr lang="bg-BG" sz="2400" dirty="0" smtClean="0">
+                <a:solidFill>
+                  <a:srgbClr val="FFFF00"/>
+                </a:solidFill>
+                <a:latin typeface="Sofia Sans Cond" panose="020B0503060000020004" pitchFamily="34" charset="0"/>
+              </a:rPr>
+              <a:t>нищо,</a:t>
+            </a:r>
+            <a:r>
+              <a:rPr lang="en-US" sz="2400" dirty="0" smtClean="0">
+                <a:solidFill>
+                  <a:srgbClr val="FFFF00"/>
+                </a:solidFill>
+                <a:latin typeface="Sofia Sans Cond" panose="020B0503060000020004" pitchFamily="34" charset="0"/>
+              </a:rPr>
+              <a:t> </a:t>
+            </a:r>
+            <a:r>
+              <a:rPr lang="bg-BG" sz="2400" dirty="0" smtClean="0">
+                <a:solidFill>
+                  <a:srgbClr val="FFFF00"/>
+                </a:solidFill>
+                <a:latin typeface="Sofia Sans Cond" panose="020B0503060000020004" pitchFamily="34" charset="0"/>
+              </a:rPr>
+              <a:t>за </a:t>
+            </a:r>
+            <a:r>
+              <a:rPr lang="bg-BG" sz="2400" dirty="0">
+                <a:solidFill>
+                  <a:srgbClr val="FFFF00"/>
+                </a:solidFill>
+                <a:latin typeface="Sofia Sans Cond" panose="020B0503060000020004" pitchFamily="34" charset="0"/>
+              </a:rPr>
+              <a:t>да се хване патето – щом курсорът попадне </a:t>
+            </a:r>
+            <a:r>
+              <a:rPr lang="en-US" sz="2400" dirty="0" smtClean="0">
+                <a:solidFill>
+                  <a:srgbClr val="FFFF00"/>
+                </a:solidFill>
+                <a:latin typeface="Sofia Sans Cond" panose="020B0503060000020004" pitchFamily="34" charset="0"/>
+              </a:rPr>
+              <a:t>	</a:t>
+            </a:r>
+            <a:r>
+              <a:rPr lang="bg-BG" sz="2400" dirty="0" smtClean="0">
+                <a:solidFill>
+                  <a:srgbClr val="FFFF00"/>
+                </a:solidFill>
+                <a:latin typeface="Sofia Sans Cond" panose="020B0503060000020004" pitchFamily="34" charset="0"/>
+              </a:rPr>
+              <a:t>върху антенката</a:t>
+            </a:r>
+            <a:r>
+              <a:rPr lang="bg-BG" sz="2400" dirty="0">
+                <a:solidFill>
+                  <a:srgbClr val="FFFF00"/>
+                </a:solidFill>
+                <a:latin typeface="Sofia Sans Cond" panose="020B0503060000020004" pitchFamily="34" charset="0"/>
+              </a:rPr>
+              <a:t>, птицата автоматично е уловена. Ако </a:t>
+            </a:r>
+            <a:r>
+              <a:rPr lang="en-US" sz="2400" dirty="0" smtClean="0">
+                <a:solidFill>
+                  <a:srgbClr val="FFFF00"/>
+                </a:solidFill>
+                <a:latin typeface="Sofia Sans Cond" panose="020B0503060000020004" pitchFamily="34" charset="0"/>
+              </a:rPr>
+              <a:t>	</a:t>
+            </a:r>
+            <a:r>
+              <a:rPr lang="bg-BG" sz="2400" dirty="0" smtClean="0">
+                <a:solidFill>
+                  <a:srgbClr val="FFFF00"/>
+                </a:solidFill>
+                <a:latin typeface="Sofia Sans Cond" panose="020B0503060000020004" pitchFamily="34" charset="0"/>
+              </a:rPr>
+              <a:t>обаче посочиш </a:t>
+            </a:r>
+            <a:r>
+              <a:rPr lang="bg-BG" sz="2400" dirty="0">
+                <a:solidFill>
+                  <a:srgbClr val="FFFF00"/>
+                </a:solidFill>
+                <a:latin typeface="Sofia Sans Cond" panose="020B0503060000020004" pitchFamily="34" charset="0"/>
+              </a:rPr>
+              <a:t>някъде другаде, патицата започва да лети </a:t>
+            </a:r>
+            <a:r>
+              <a:rPr lang="en-US" sz="2400" dirty="0" smtClean="0">
+                <a:solidFill>
+                  <a:srgbClr val="FFFF00"/>
+                </a:solidFill>
+                <a:latin typeface="Sofia Sans Cond" panose="020B0503060000020004" pitchFamily="34" charset="0"/>
+              </a:rPr>
+              <a:t>	</a:t>
+            </a:r>
+            <a:r>
+              <a:rPr lang="bg-BG" sz="2400" dirty="0" smtClean="0">
+                <a:solidFill>
+                  <a:srgbClr val="FFFF00"/>
+                </a:solidFill>
+                <a:latin typeface="Sofia Sans Cond" panose="020B0503060000020004" pitchFamily="34" charset="0"/>
+              </a:rPr>
+              <a:t>по-бързо </a:t>
+            </a:r>
+            <a:r>
+              <a:rPr lang="bg-BG" sz="2400" dirty="0">
+                <a:solidFill>
+                  <a:srgbClr val="FFFF00"/>
+                </a:solidFill>
+                <a:latin typeface="Sofia Sans Cond" panose="020B0503060000020004" pitchFamily="34" charset="0"/>
+              </a:rPr>
+              <a:t>и да се върти неконтролируемо.</a:t>
+            </a:r>
+            <a:endParaRPr lang="bg-BG" sz="2400" dirty="0">
+              <a:solidFill>
+                <a:srgbClr val="FFFF00"/>
+              </a:solidFill>
+              <a:latin typeface="Sofia Sans Cond" panose="020B0503060000020004" pitchFamily="34" charset="0"/>
+            </a:endParaRPr>
+          </a:p>
+        </p:txBody>
+      </p:sp>
+      <p:sp>
+        <p:nvSpPr>
+          <p:cNvPr id="24" name="Rectangle 23"/>
+          <p:cNvSpPr/>
+          <p:nvPr/>
+        </p:nvSpPr>
+        <p:spPr>
+          <a:xfrm>
+            <a:off x="457200" y="15058492"/>
+            <a:ext cx="7102474" cy="4062651"/>
+          </a:xfrm>
+          <a:prstGeom prst="rect">
+            <a:avLst/>
+          </a:prstGeom>
+          <a:ln>
+            <a:noFill/>
+          </a:ln>
+        </p:spPr>
+        <p:txBody>
+          <a:bodyPr wrap="square">
+            <a:spAutoFit/>
+          </a:bodyPr>
+          <a:lstStyle/>
+          <a:p>
+            <a:r>
+              <a:rPr lang="en-US" sz="4800" dirty="0" smtClean="0">
+                <a:solidFill>
+                  <a:srgbClr val="FFFF00"/>
+                </a:solidFill>
+                <a:latin typeface="Sofia Sans Cond" panose="020B0503060000020004" pitchFamily="34" charset="0"/>
+              </a:rPr>
+              <a:t>	</a:t>
+            </a:r>
+            <a:r>
+              <a:rPr lang="bg-BG" sz="4800" dirty="0" smtClean="0">
+                <a:solidFill>
+                  <a:srgbClr val="FFFF00"/>
+                </a:solidFill>
+                <a:latin typeface="Sofia Sans Cond" panose="020B0503060000020004" pitchFamily="34" charset="0"/>
+              </a:rPr>
+              <a:t>Бъдещо </a:t>
+            </a:r>
+            <a:r>
+              <a:rPr lang="bg-BG" sz="4800" dirty="0">
+                <a:solidFill>
+                  <a:srgbClr val="FFFF00"/>
+                </a:solidFill>
+                <a:latin typeface="Sofia Sans Cond" panose="020B0503060000020004" pitchFamily="34" charset="0"/>
+              </a:rPr>
+              <a:t>развитие</a:t>
+            </a:r>
+          </a:p>
+          <a:p>
+            <a:endParaRPr lang="bg-BG" dirty="0">
+              <a:solidFill>
+                <a:srgbClr val="FFFF00"/>
+              </a:solidFill>
+              <a:latin typeface="Sofia Sans Cond" panose="020B0503060000020004" pitchFamily="34" charset="0"/>
+            </a:endParaRPr>
+          </a:p>
+          <a:p>
+            <a:r>
+              <a:rPr lang="bg-BG" dirty="0">
+                <a:solidFill>
+                  <a:srgbClr val="FFFF00"/>
+                </a:solidFill>
+                <a:latin typeface="Sofia Sans Cond" panose="020B0503060000020004" pitchFamily="34" charset="0"/>
+              </a:rPr>
+              <a:t>	</a:t>
+            </a:r>
+            <a:r>
+              <a:rPr lang="bg-BG" sz="2400" dirty="0">
+                <a:solidFill>
+                  <a:srgbClr val="FFFF00"/>
+                </a:solidFill>
+                <a:latin typeface="Sofia Sans Cond" panose="020B0503060000020004" pitchFamily="34" charset="0"/>
+              </a:rPr>
+              <a:t>Поставили сме си няколко цели за пълното довършване на </a:t>
+            </a:r>
+            <a:r>
+              <a:rPr lang="en-US" sz="2400" dirty="0" smtClean="0">
+                <a:solidFill>
+                  <a:srgbClr val="FFFF00"/>
+                </a:solidFill>
+                <a:latin typeface="Sofia Sans Cond" panose="020B0503060000020004" pitchFamily="34" charset="0"/>
+              </a:rPr>
+              <a:t>	</a:t>
+            </a:r>
+            <a:r>
+              <a:rPr lang="bg-BG" sz="2400" dirty="0" smtClean="0">
+                <a:solidFill>
+                  <a:srgbClr val="FFFF00"/>
+                </a:solidFill>
+                <a:latin typeface="Sofia Sans Cond" panose="020B0503060000020004" pitchFamily="34" charset="0"/>
+              </a:rPr>
+              <a:t>играта</a:t>
+            </a:r>
+            <a:r>
+              <a:rPr lang="bg-BG" sz="2400" dirty="0">
+                <a:solidFill>
+                  <a:srgbClr val="FFFF00"/>
+                </a:solidFill>
+                <a:latin typeface="Sofia Sans Cond" panose="020B0503060000020004" pitchFamily="34" charset="0"/>
+              </a:rPr>
+              <a:t>, които смятаме да изпълним до началото на </a:t>
+            </a:r>
+            <a:r>
+              <a:rPr lang="en-US" sz="2400" dirty="0" smtClean="0">
+                <a:solidFill>
+                  <a:srgbClr val="FFFF00"/>
+                </a:solidFill>
+                <a:latin typeface="Sofia Sans Cond" panose="020B0503060000020004" pitchFamily="34" charset="0"/>
+              </a:rPr>
+              <a:t>	</a:t>
+            </a:r>
+            <a:r>
+              <a:rPr lang="bg-BG" sz="2400" dirty="0" smtClean="0">
+                <a:solidFill>
+                  <a:srgbClr val="FFFF00"/>
+                </a:solidFill>
+                <a:latin typeface="Sofia Sans Cond" panose="020B0503060000020004" pitchFamily="34" charset="0"/>
+              </a:rPr>
+              <a:t>следващата </a:t>
+            </a:r>
+            <a:r>
+              <a:rPr lang="bg-BG" sz="2400" dirty="0">
+                <a:solidFill>
+                  <a:srgbClr val="FFFF00"/>
+                </a:solidFill>
+                <a:latin typeface="Sofia Sans Cond" panose="020B0503060000020004" pitchFamily="34" charset="0"/>
+              </a:rPr>
+              <a:t>учебна година. Първо, смятаме да добавим и </a:t>
+            </a:r>
+            <a:r>
+              <a:rPr lang="en-US" sz="2400" dirty="0" smtClean="0">
+                <a:solidFill>
+                  <a:srgbClr val="FFFF00"/>
+                </a:solidFill>
+                <a:latin typeface="Sofia Sans Cond" panose="020B0503060000020004" pitchFamily="34" charset="0"/>
+              </a:rPr>
+              <a:t>	</a:t>
+            </a:r>
+            <a:r>
+              <a:rPr lang="bg-BG" sz="2400" dirty="0" smtClean="0">
+                <a:solidFill>
+                  <a:srgbClr val="FFFF00"/>
+                </a:solidFill>
+                <a:latin typeface="Sofia Sans Cond" panose="020B0503060000020004" pitchFamily="34" charset="0"/>
+              </a:rPr>
+              <a:t>прехвърчащи </a:t>
+            </a:r>
+            <a:r>
+              <a:rPr lang="bg-BG" sz="2400" dirty="0">
+                <a:solidFill>
+                  <a:srgbClr val="FFFF00"/>
+                </a:solidFill>
+                <a:latin typeface="Sofia Sans Cond" panose="020B0503060000020004" pitchFamily="34" charset="0"/>
+              </a:rPr>
+              <a:t>астероиди, които в зависимост от вида си </a:t>
+            </a:r>
+            <a:r>
+              <a:rPr lang="en-US" sz="2400" dirty="0" smtClean="0">
+                <a:solidFill>
+                  <a:srgbClr val="FFFF00"/>
+                </a:solidFill>
+                <a:latin typeface="Sofia Sans Cond" panose="020B0503060000020004" pitchFamily="34" charset="0"/>
+              </a:rPr>
+              <a:t>	</a:t>
+            </a:r>
+            <a:r>
+              <a:rPr lang="bg-BG" sz="2400" dirty="0" smtClean="0">
+                <a:solidFill>
+                  <a:srgbClr val="FFFF00"/>
+                </a:solidFill>
+                <a:latin typeface="Sofia Sans Cond" panose="020B0503060000020004" pitchFamily="34" charset="0"/>
+              </a:rPr>
+              <a:t>ти помагат </a:t>
+            </a:r>
+            <a:r>
+              <a:rPr lang="bg-BG" sz="2400" dirty="0">
+                <a:solidFill>
+                  <a:srgbClr val="FFFF00"/>
+                </a:solidFill>
+                <a:latin typeface="Sofia Sans Cond" panose="020B0503060000020004" pitchFamily="34" charset="0"/>
+              </a:rPr>
+              <a:t>или пречат да натрупаш повече точки. </a:t>
+            </a:r>
+            <a:r>
+              <a:rPr lang="en-US" sz="2400" dirty="0" smtClean="0">
+                <a:solidFill>
+                  <a:srgbClr val="FFFF00"/>
+                </a:solidFill>
+                <a:latin typeface="Sofia Sans Cond" panose="020B0503060000020004" pitchFamily="34" charset="0"/>
+              </a:rPr>
+              <a:t>	</a:t>
+            </a:r>
+            <a:r>
+              <a:rPr lang="bg-BG" sz="2400" dirty="0" smtClean="0">
+                <a:solidFill>
+                  <a:srgbClr val="FFFF00"/>
+                </a:solidFill>
+                <a:latin typeface="Sofia Sans Cond" panose="020B0503060000020004" pitchFamily="34" charset="0"/>
+              </a:rPr>
+              <a:t>Смятаме </a:t>
+            </a:r>
+            <a:r>
+              <a:rPr lang="bg-BG" sz="2400" dirty="0">
+                <a:solidFill>
+                  <a:srgbClr val="FFFF00"/>
+                </a:solidFill>
+                <a:latin typeface="Sofia Sans Cond" panose="020B0503060000020004" pitchFamily="34" charset="0"/>
+              </a:rPr>
+              <a:t>и да </a:t>
+            </a:r>
+            <a:r>
+              <a:rPr lang="bg-BG" sz="2400" dirty="0" smtClean="0">
+                <a:solidFill>
+                  <a:srgbClr val="FFFF00"/>
+                </a:solidFill>
+                <a:latin typeface="Sofia Sans Cond" panose="020B0503060000020004" pitchFamily="34" charset="0"/>
+              </a:rPr>
+              <a:t>направим </a:t>
+            </a:r>
+            <a:r>
+              <a:rPr lang="bg-BG" sz="2400" dirty="0">
+                <a:solidFill>
+                  <a:srgbClr val="FFFF00"/>
+                </a:solidFill>
+                <a:latin typeface="Sofia Sans Cond" panose="020B0503060000020004" pitchFamily="34" charset="0"/>
+              </a:rPr>
+              <a:t>уебсайт, където да може да се </a:t>
+            </a:r>
+            <a:r>
+              <a:rPr lang="en-US" sz="2400" dirty="0" smtClean="0">
+                <a:solidFill>
+                  <a:srgbClr val="FFFF00"/>
+                </a:solidFill>
+                <a:latin typeface="Sofia Sans Cond" panose="020B0503060000020004" pitchFamily="34" charset="0"/>
+              </a:rPr>
+              <a:t>	</a:t>
+            </a:r>
+            <a:r>
+              <a:rPr lang="bg-BG" sz="2400" dirty="0" smtClean="0">
+                <a:solidFill>
+                  <a:srgbClr val="FFFF00"/>
+                </a:solidFill>
+                <a:latin typeface="Sofia Sans Cond" panose="020B0503060000020004" pitchFamily="34" charset="0"/>
+              </a:rPr>
+              <a:t>играе </a:t>
+            </a:r>
+            <a:r>
+              <a:rPr lang="bg-BG" sz="2400" dirty="0">
+                <a:solidFill>
+                  <a:srgbClr val="FFFF00"/>
+                </a:solidFill>
+                <a:latin typeface="Sofia Sans Cond" panose="020B0503060000020004" pitchFamily="34" charset="0"/>
+              </a:rPr>
+              <a:t>играта, а </a:t>
+            </a:r>
+            <a:r>
+              <a:rPr lang="bg-BG" sz="2400" dirty="0" smtClean="0">
+                <a:solidFill>
+                  <a:srgbClr val="FFFF00"/>
+                </a:solidFill>
+                <a:latin typeface="Sofia Sans Cond" panose="020B0503060000020004" pitchFamily="34" charset="0"/>
+              </a:rPr>
+              <a:t>истинските </a:t>
+            </a:r>
+            <a:r>
+              <a:rPr lang="bg-BG" sz="2400" dirty="0">
+                <a:solidFill>
+                  <a:srgbClr val="FFFF00"/>
+                </a:solidFill>
+                <a:latin typeface="Sofia Sans Cond" panose="020B0503060000020004" pitchFamily="34" charset="0"/>
+              </a:rPr>
+              <a:t>фенове ще могат и да я </a:t>
+            </a:r>
+            <a:r>
+              <a:rPr lang="en-US" sz="2400" dirty="0" smtClean="0">
+                <a:solidFill>
+                  <a:srgbClr val="FFFF00"/>
+                </a:solidFill>
+                <a:latin typeface="Sofia Sans Cond" panose="020B0503060000020004" pitchFamily="34" charset="0"/>
+              </a:rPr>
+              <a:t>	</a:t>
+            </a:r>
+            <a:r>
+              <a:rPr lang="bg-BG" sz="2400" dirty="0" smtClean="0">
+                <a:solidFill>
+                  <a:srgbClr val="FFFF00"/>
+                </a:solidFill>
+                <a:latin typeface="Sofia Sans Cond" panose="020B0503060000020004" pitchFamily="34" charset="0"/>
+              </a:rPr>
+              <a:t>инсталират </a:t>
+            </a:r>
+            <a:r>
+              <a:rPr lang="bg-BG" sz="2400" dirty="0">
+                <a:solidFill>
+                  <a:srgbClr val="FFFF00"/>
+                </a:solidFill>
+                <a:latin typeface="Sofia Sans Cond" panose="020B0503060000020004" pitchFamily="34" charset="0"/>
+              </a:rPr>
+              <a:t>на своите </a:t>
+            </a:r>
+            <a:r>
+              <a:rPr lang="bg-BG" sz="2400" dirty="0" smtClean="0">
+                <a:solidFill>
+                  <a:srgbClr val="FFFF00"/>
+                </a:solidFill>
+                <a:latin typeface="Sofia Sans Cond" panose="020B0503060000020004" pitchFamily="34" charset="0"/>
+              </a:rPr>
+              <a:t>компютри </a:t>
+            </a:r>
+            <a:r>
+              <a:rPr lang="bg-BG" sz="2400" dirty="0">
+                <a:solidFill>
+                  <a:srgbClr val="FFFF00"/>
+                </a:solidFill>
+                <a:latin typeface="Sofia Sans Cond" panose="020B0503060000020004" pitchFamily="34" charset="0"/>
+              </a:rPr>
+              <a:t>или телефони.</a:t>
+            </a:r>
+            <a:endParaRPr lang="bg-BG" sz="2400" dirty="0"/>
+          </a:p>
+        </p:txBody>
+      </p:sp>
+      <p:pic>
+        <p:nvPicPr>
+          <p:cNvPr id="25" name="Picture 2" descr="https://cdn.discordapp.com/attachments/960191998462165033/961419990119088128/GolemoPate.png"/>
+          <p:cNvPicPr>
+            <a:picLocks noChangeAspect="1" noChangeArrowheads="1"/>
+          </p:cNvPicPr>
+          <p:nvPr/>
+        </p:nvPicPr>
+        <p:blipFill rotWithShape="1">
+          <a:blip r:embed="rId7">
+            <a:extLst>
+              <a:ext uri="{28A0092B-C50C-407E-A947-70E740481C1C}">
+                <a14:useLocalDpi xmlns:a14="http://schemas.microsoft.com/office/drawing/2010/main" val="0"/>
+              </a:ext>
+            </a:extLst>
+          </a:blip>
+          <a:srcRect l="867" t="394" r="457" b="491"/>
+          <a:stretch/>
+        </p:blipFill>
+        <p:spPr bwMode="auto">
+          <a:xfrm rot="1654823">
+            <a:off x="1720647" y="454819"/>
+            <a:ext cx="2117034" cy="2203167"/>
+          </a:xfrm>
+          <a:prstGeom prst="rect">
+            <a:avLst/>
+          </a:prstGeom>
+          <a:noFill/>
+          <a:extLst>
+            <a:ext uri="{909E8E84-426E-40DD-AFC4-6F175D3DCCD1}">
+              <a14:hiddenFill xmlns:a14="http://schemas.microsoft.com/office/drawing/2010/main">
+                <a:solidFill>
+                  <a:srgbClr val="FFFFFF"/>
+                </a:solidFill>
+              </a14:hiddenFill>
+            </a:ext>
+          </a:extLst>
+        </p:spPr>
+      </p:pic>
+      <p:pic>
+        <p:nvPicPr>
+          <p:cNvPr id="15" name="Picture 7" descr="https://www.elsys-bg.org/web/files/news/309/main_image/thumb_420x0_thumb_980x630_logo2.png"/>
+          <p:cNvPicPr>
+            <a:picLocks noChangeAspect="1" noChangeArrowheads="1"/>
+          </p:cNvPicPr>
+          <p:nvPr/>
+        </p:nvPicPr>
+        <p:blipFill rotWithShape="1">
+          <a:blip r:embed="rId8">
+            <a:extLst>
+              <a:ext uri="{BEBA8EAE-BF5A-486C-A8C5-ECC9F3942E4B}">
+                <a14:imgProps xmlns:a14="http://schemas.microsoft.com/office/drawing/2010/main">
+                  <a14:imgLayer r:embed="rId9">
+                    <a14:imgEffect>
+                      <a14:backgroundRemoval t="0" b="100000" l="0" r="100000">
+                        <a14:foregroundMark x1="31429" y1="36667" x2="68333" y2="62593"/>
+                        <a14:foregroundMark x1="32143" y1="32222" x2="42619" y2="32963"/>
+                        <a14:foregroundMark x1="43095" y1="32593" x2="42619" y2="60370"/>
+                        <a14:foregroundMark x1="38333" y1="60370" x2="58571" y2="60000"/>
+                        <a14:foregroundMark x1="38333" y1="38519" x2="39048" y2="60000"/>
+                        <a14:foregroundMark x1="29048" y1="32593" x2="34048" y2="55185"/>
+                        <a14:foregroundMark x1="29286" y1="39259" x2="29048" y2="54444"/>
+                        <a14:foregroundMark x1="45714" y1="39630" x2="75714" y2="38889"/>
+                        <a14:foregroundMark x1="71905" y1="70741" x2="71667" y2="34444"/>
+                        <a14:foregroundMark x1="46667" y1="46667" x2="72143" y2="45185"/>
+                        <a14:foregroundMark x1="56190" y1="67037" x2="72619" y2="67037"/>
+                      </a14:backgroundRemoval>
+                    </a14:imgEffect>
+                  </a14:imgLayer>
+                </a14:imgProps>
+              </a:ext>
+              <a:ext uri="{28A0092B-C50C-407E-A947-70E740481C1C}">
+                <a14:useLocalDpi xmlns:a14="http://schemas.microsoft.com/office/drawing/2010/main" val="0"/>
+              </a:ext>
+            </a:extLst>
+          </a:blip>
+          <a:srcRect l="17857" r="17857"/>
+          <a:stretch/>
+        </p:blipFill>
+        <p:spPr bwMode="auto">
+          <a:xfrm>
+            <a:off x="457199" y="456917"/>
+            <a:ext cx="2559600" cy="2559600"/>
+          </a:xfrm>
+          <a:prstGeom prst="ellipse">
+            <a:avLst/>
+          </a:prstGeom>
+          <a:noFill/>
+          <a:extLst>
+            <a:ext uri="{909E8E84-426E-40DD-AFC4-6F175D3DCCD1}">
+              <a14:hiddenFill xmlns:a14="http://schemas.microsoft.com/office/drawing/2010/main">
+                <a:solidFill>
+                  <a:srgbClr val="FFFFFF"/>
+                </a:solidFill>
+              </a14:hiddenFill>
+            </a:ext>
+          </a:extLst>
+        </p:spPr>
+      </p:pic>
+      <p:sp>
+        <p:nvSpPr>
+          <p:cNvPr id="29" name="Rectangle 28"/>
+          <p:cNvSpPr/>
+          <p:nvPr/>
+        </p:nvSpPr>
+        <p:spPr>
+          <a:xfrm>
+            <a:off x="7559674" y="14202018"/>
+            <a:ext cx="7102475" cy="1938992"/>
+          </a:xfrm>
+          <a:prstGeom prst="rect">
+            <a:avLst/>
+          </a:prstGeom>
+        </p:spPr>
+        <p:txBody>
+          <a:bodyPr wrap="square">
+            <a:spAutoFit/>
+          </a:bodyPr>
+          <a:lstStyle/>
+          <a:p>
+            <a:r>
+              <a:rPr lang="en-US" sz="4800" dirty="0" smtClean="0">
+                <a:solidFill>
+                  <a:srgbClr val="FFFF00"/>
+                </a:solidFill>
+                <a:latin typeface="Sofia Sans Cond" panose="020B0503060000020004" pitchFamily="34" charset="0"/>
+              </a:rPr>
+              <a:t>	</a:t>
+            </a:r>
+            <a:r>
+              <a:rPr lang="bg-BG" sz="4800" dirty="0" smtClean="0">
+                <a:solidFill>
+                  <a:srgbClr val="FFFF00"/>
+                </a:solidFill>
+                <a:latin typeface="Sofia Sans Cond" panose="020B0503060000020004" pitchFamily="34" charset="0"/>
+              </a:rPr>
+              <a:t>Използвани </a:t>
+            </a:r>
+            <a:r>
+              <a:rPr lang="bg-BG" sz="4800" dirty="0">
+                <a:solidFill>
+                  <a:srgbClr val="FFFF00"/>
+                </a:solidFill>
+                <a:latin typeface="Sofia Sans Cond" panose="020B0503060000020004" pitchFamily="34" charset="0"/>
+              </a:rPr>
+              <a:t>технологии</a:t>
+            </a:r>
+          </a:p>
+          <a:p>
+            <a:endParaRPr lang="bg-BG" sz="2400" dirty="0">
+              <a:solidFill>
+                <a:srgbClr val="FFFF00"/>
+              </a:solidFill>
+              <a:latin typeface="Sofia Sans Cond" panose="020B0503060000020004" pitchFamily="34" charset="0"/>
+            </a:endParaRPr>
+          </a:p>
+          <a:p>
+            <a:r>
+              <a:rPr lang="en-US" sz="2400" dirty="0">
+                <a:solidFill>
+                  <a:srgbClr val="FFFF00"/>
+                </a:solidFill>
+                <a:latin typeface="Sofia Sans Cond" panose="020B0503060000020004" pitchFamily="34" charset="0"/>
+              </a:rPr>
+              <a:t>	</a:t>
+            </a:r>
+            <a:r>
+              <a:rPr lang="bg-BG" sz="2400" dirty="0">
+                <a:solidFill>
+                  <a:srgbClr val="FFFF00"/>
+                </a:solidFill>
+                <a:latin typeface="Sofia Sans Cond" panose="020B0503060000020004" pitchFamily="34" charset="0"/>
+              </a:rPr>
+              <a:t>Играта е написана на езика за програмиране </a:t>
+            </a:r>
+            <a:r>
+              <a:rPr lang="en-US" sz="2400" dirty="0">
+                <a:solidFill>
+                  <a:srgbClr val="FFFF00"/>
+                </a:solidFill>
+                <a:latin typeface="Sofia Sans Cond" panose="020B0503060000020004" pitchFamily="34" charset="0"/>
+              </a:rPr>
+              <a:t>Python</a:t>
+            </a:r>
+            <a:r>
+              <a:rPr lang="bg-BG" sz="2400" dirty="0">
+                <a:solidFill>
+                  <a:srgbClr val="FFFF00"/>
+                </a:solidFill>
+                <a:latin typeface="Sofia Sans Cond" panose="020B0503060000020004" pitchFamily="34" charset="0"/>
+              </a:rPr>
+              <a:t>, като </a:t>
+            </a:r>
+            <a:r>
+              <a:rPr lang="en-US" sz="2400" dirty="0" smtClean="0">
+                <a:solidFill>
+                  <a:srgbClr val="FFFF00"/>
+                </a:solidFill>
+                <a:latin typeface="Sofia Sans Cond" panose="020B0503060000020004" pitchFamily="34" charset="0"/>
+              </a:rPr>
+              <a:t>	</a:t>
+            </a:r>
+            <a:r>
+              <a:rPr lang="bg-BG" sz="2400" dirty="0" smtClean="0">
+                <a:solidFill>
+                  <a:srgbClr val="FFFF00"/>
+                </a:solidFill>
+                <a:latin typeface="Sofia Sans Cond" panose="020B0503060000020004" pitchFamily="34" charset="0"/>
+              </a:rPr>
+              <a:t>са използвани </a:t>
+            </a:r>
+            <a:r>
+              <a:rPr lang="bg-BG" sz="2400" dirty="0">
+                <a:solidFill>
+                  <a:srgbClr val="FFFF00"/>
+                </a:solidFill>
+                <a:latin typeface="Sofia Sans Cond" panose="020B0503060000020004" pitchFamily="34" charset="0"/>
+              </a:rPr>
+              <a:t>и модулите </a:t>
+            </a:r>
+            <a:r>
+              <a:rPr lang="en-US" sz="2400" dirty="0" err="1">
+                <a:solidFill>
+                  <a:srgbClr val="FFFF00"/>
+                </a:solidFill>
+                <a:latin typeface="Sofia Sans Cond" panose="020B0503060000020004" pitchFamily="34" charset="0"/>
+              </a:rPr>
+              <a:t>Pygame</a:t>
+            </a:r>
+            <a:r>
+              <a:rPr lang="en-US" sz="2400" dirty="0">
+                <a:solidFill>
+                  <a:srgbClr val="FFFF00"/>
+                </a:solidFill>
+                <a:latin typeface="Sofia Sans Cond" panose="020B0503060000020004" pitchFamily="34" charset="0"/>
+              </a:rPr>
+              <a:t>, </a:t>
+            </a:r>
+            <a:r>
+              <a:rPr lang="en-US" sz="2400" dirty="0" err="1">
+                <a:solidFill>
+                  <a:srgbClr val="FFFF00"/>
+                </a:solidFill>
+                <a:latin typeface="Sofia Sans Cond" panose="020B0503060000020004" pitchFamily="34" charset="0"/>
+              </a:rPr>
+              <a:t>Pymenu</a:t>
+            </a:r>
+            <a:r>
+              <a:rPr lang="en-US" sz="2400" dirty="0">
+                <a:solidFill>
+                  <a:srgbClr val="FFFF00"/>
+                </a:solidFill>
+                <a:latin typeface="Sofia Sans Cond" panose="020B0503060000020004" pitchFamily="34" charset="0"/>
+              </a:rPr>
+              <a:t> </a:t>
+            </a:r>
+            <a:r>
+              <a:rPr lang="bg-BG" sz="2400" dirty="0">
+                <a:solidFill>
+                  <a:srgbClr val="FFFF00"/>
+                </a:solidFill>
+                <a:latin typeface="Sofia Sans Cond" panose="020B0503060000020004" pitchFamily="34" charset="0"/>
+              </a:rPr>
+              <a:t>и </a:t>
+            </a:r>
+            <a:r>
+              <a:rPr lang="en-US" sz="2400" dirty="0" err="1">
+                <a:solidFill>
+                  <a:srgbClr val="FFFF00"/>
+                </a:solidFill>
+                <a:latin typeface="Sofia Sans Cond" panose="020B0503060000020004" pitchFamily="34" charset="0"/>
+              </a:rPr>
+              <a:t>Pymunk</a:t>
+            </a:r>
+            <a:r>
+              <a:rPr lang="en-US" sz="2400" dirty="0">
+                <a:solidFill>
+                  <a:srgbClr val="FFFF00"/>
+                </a:solidFill>
+                <a:latin typeface="Sofia Sans Cond" panose="020B0503060000020004" pitchFamily="34" charset="0"/>
+              </a:rPr>
+              <a:t>.</a:t>
+            </a:r>
+            <a:endParaRPr lang="bg-BG" sz="2400" dirty="0">
+              <a:solidFill>
+                <a:srgbClr val="FFFF00"/>
+              </a:solidFill>
+              <a:latin typeface="Sofia Sans Cond" panose="020B0503060000020004" pitchFamily="34" charset="0"/>
+            </a:endParaRPr>
+          </a:p>
+        </p:txBody>
+      </p:sp>
+      <p:sp>
+        <p:nvSpPr>
+          <p:cNvPr id="30" name="Rectangle 29"/>
+          <p:cNvSpPr/>
+          <p:nvPr/>
+        </p:nvSpPr>
+        <p:spPr>
+          <a:xfrm>
+            <a:off x="7559029" y="19183099"/>
+            <a:ext cx="7102475" cy="1384995"/>
+          </a:xfrm>
+          <a:prstGeom prst="rect">
+            <a:avLst/>
+          </a:prstGeom>
+        </p:spPr>
+        <p:txBody>
+          <a:bodyPr wrap="square">
+            <a:spAutoFit/>
+          </a:bodyPr>
+          <a:lstStyle/>
+          <a:p>
+            <a:pPr algn="just"/>
+            <a:r>
+              <a:rPr lang="en-US" sz="2800" dirty="0" smtClean="0">
+                <a:solidFill>
+                  <a:srgbClr val="FFFF00"/>
+                </a:solidFill>
+                <a:latin typeface="Sofia Sans Cond" panose="020B0503060000020004" pitchFamily="34" charset="0"/>
+              </a:rPr>
+              <a:t>	</a:t>
+            </a:r>
+            <a:r>
+              <a:rPr lang="bg-BG" sz="2800" b="1" dirty="0" smtClean="0">
+                <a:solidFill>
+                  <a:srgbClr val="FFFF00"/>
+                </a:solidFill>
+                <a:latin typeface="Sofia Sans Cond" panose="020B0503060000020004" pitchFamily="34" charset="0"/>
+              </a:rPr>
+              <a:t>Проектът </a:t>
+            </a:r>
+            <a:r>
+              <a:rPr lang="bg-BG" sz="2800" b="1" dirty="0">
+                <a:solidFill>
+                  <a:srgbClr val="FFFF00"/>
+                </a:solidFill>
+                <a:latin typeface="Sofia Sans Cond" panose="020B0503060000020004" pitchFamily="34" charset="0"/>
+              </a:rPr>
+              <a:t>е разработен от:</a:t>
+            </a:r>
+          </a:p>
+          <a:p>
+            <a:pPr marL="742950" lvl="1" indent="-285750" algn="just">
+              <a:buFontTx/>
+              <a:buChar char="-"/>
+            </a:pPr>
+            <a:r>
+              <a:rPr lang="bg-BG" sz="2800" dirty="0">
+                <a:solidFill>
+                  <a:srgbClr val="FFFF00"/>
+                </a:solidFill>
+                <a:latin typeface="Sofia Sans Cond" panose="020B0503060000020004" pitchFamily="34" charset="0"/>
+              </a:rPr>
+              <a:t>Димитър Грозев, 9 „а“ клас</a:t>
+            </a:r>
+          </a:p>
+          <a:p>
+            <a:pPr marL="742950" lvl="1" indent="-285750" algn="just">
+              <a:buFontTx/>
+              <a:buChar char="-"/>
+            </a:pPr>
+            <a:r>
+              <a:rPr lang="bg-BG" sz="2800" dirty="0">
+                <a:solidFill>
+                  <a:srgbClr val="FFFF00"/>
+                </a:solidFill>
+                <a:latin typeface="Sofia Sans Cond" panose="020B0503060000020004" pitchFamily="34" charset="0"/>
+              </a:rPr>
+              <a:t>Николай Захариев, 9 „а“ клас</a:t>
+            </a:r>
+            <a:endParaRPr lang="bg-BG" sz="2800" dirty="0">
+              <a:solidFill>
+                <a:srgbClr val="FFFF00"/>
+              </a:solidFill>
+              <a:latin typeface="Sofia Sans Cond" panose="020B0503060000020004" pitchFamily="34" charset="0"/>
+            </a:endParaRPr>
+          </a:p>
+        </p:txBody>
+      </p:sp>
+      <p:pic>
+        <p:nvPicPr>
+          <p:cNvPr id="31" name="Picture 2" descr="https://cdn.discordapp.com/attachments/960191998462165033/961419990119088128/GolemoPate.png"/>
+          <p:cNvPicPr>
+            <a:picLocks noChangeAspect="1" noChangeArrowheads="1"/>
+          </p:cNvPicPr>
+          <p:nvPr/>
+        </p:nvPicPr>
+        <p:blipFill rotWithShape="1">
+          <a:blip r:embed="rId7">
+            <a:extLst>
+              <a:ext uri="{28A0092B-C50C-407E-A947-70E740481C1C}">
+                <a14:useLocalDpi xmlns:a14="http://schemas.microsoft.com/office/drawing/2010/main" val="0"/>
+              </a:ext>
+            </a:extLst>
+          </a:blip>
+          <a:srcRect l="867" t="847" r="1095" b="815"/>
+          <a:stretch/>
+        </p:blipFill>
+        <p:spPr bwMode="auto">
+          <a:xfrm rot="19993998" flipH="1">
+            <a:off x="12580738" y="16001738"/>
+            <a:ext cx="4189703" cy="4354140"/>
+          </a:xfrm>
+          <a:prstGeom prst="rect">
+            <a:avLst/>
+          </a:prstGeom>
+          <a:noFill/>
+          <a:extLst>
+            <a:ext uri="{909E8E84-426E-40DD-AFC4-6F175D3DCCD1}">
+              <a14:hiddenFill xmlns:a14="http://schemas.microsoft.com/office/drawing/2010/main">
+                <a:solidFill>
+                  <a:srgbClr val="FFFFFF"/>
+                </a:solidFill>
+              </a14:hiddenFill>
+            </a:ext>
+          </a:extLst>
+        </p:spPr>
+      </p:pic>
+      <p:pic>
+        <p:nvPicPr>
+          <p:cNvPr id="34" name="Picture 33"/>
+          <p:cNvPicPr>
+            <a:picLocks noChangeAspect="1"/>
+          </p:cNvPicPr>
+          <p:nvPr/>
+        </p:nvPicPr>
+        <p:blipFill>
+          <a:blip r:embed="rId10">
+            <a:extLst>
+              <a:ext uri="{BEBA8EAE-BF5A-486C-A8C5-ECC9F3942E4B}">
+                <a14:imgProps xmlns:a14="http://schemas.microsoft.com/office/drawing/2010/main">
+                  <a14:imgLayer r:embed="rId11">
+                    <a14:imgEffect>
+                      <a14:backgroundRemoval t="0" b="100000" l="0" r="100000">
+                        <a14:foregroundMark x1="1171" y1="1626" x2="98023" y2="1626"/>
+                        <a14:foregroundMark x1="25769" y1="30759" x2="73939" y2="30081"/>
+                        <a14:backgroundMark x1="13104" y1="13008" x2="13690" y2="93089"/>
+                        <a14:backgroundMark x1="5783" y1="12737" x2="92826" y2="14905"/>
+                        <a14:backgroundMark x1="87408" y1="92005" x2="86896" y2="21274"/>
+                        <a14:backgroundMark x1="2709" y1="90921" x2="90337" y2="85230"/>
+                        <a14:backgroundMark x1="3148" y1="9350" x2="2123" y2="95122"/>
+                        <a14:backgroundMark x1="19473" y1="18022" x2="19400" y2="83333"/>
+                        <a14:backgroundMark x1="25476" y1="21409" x2="80527" y2="20732"/>
+                        <a14:backgroundMark x1="94290" y1="91463" x2="93045" y2="5827"/>
+                        <a14:backgroundMark x1="81552" y1="27778" x2="81552" y2="82520"/>
+                        <a14:backgroundMark x1="79063" y1="35637" x2="79063" y2="79946"/>
+                        <a14:backgroundMark x1="75695" y1="31572" x2="75476" y2="76287"/>
+                        <a14:backgroundMark x1="75256" y1="32385" x2="75256" y2="32385"/>
+                        <a14:backgroundMark x1="75329" y1="65854" x2="75183" y2="29946"/>
+                      </a14:backgroundRemoval>
+                    </a14:imgEffect>
+                  </a14:imgLayer>
+                </a14:imgProps>
+              </a:ext>
+            </a:extLst>
+          </a:blip>
+          <a:stretch>
+            <a:fillRect/>
+          </a:stretch>
+        </p:blipFill>
+        <p:spPr>
+          <a:xfrm>
+            <a:off x="546235" y="8273402"/>
+            <a:ext cx="6480000" cy="3500908"/>
+          </a:xfrm>
+          <a:prstGeom prst="rect">
+            <a:avLst/>
+          </a:prstGeom>
+          <a:ln>
+            <a:solidFill>
+              <a:srgbClr val="FFFF00"/>
+            </a:solidFill>
+          </a:ln>
+          <a:effectLst/>
+        </p:spPr>
+      </p:pic>
+      <p:pic>
+        <p:nvPicPr>
+          <p:cNvPr id="35" name="Picture 13" descr="https://camo.githubusercontent.com/1971c0a4f776fb5351c765c37e59630c83cabd52/68747470733a2f2f7777772e707967616d652e6f72672f696d616765732f6c6f676f2e706e67"/>
+          <p:cNvPicPr>
+            <a:picLocks noChangeAspect="1" noChangeArrowheads="1"/>
+          </p:cNvPicPr>
+          <p:nvPr/>
+        </p:nvPicPr>
+        <p:blipFill>
+          <a:blip r:embed="rId12" cstate="print">
+            <a:extLst>
+              <a:ext uri="{28A0092B-C50C-407E-A947-70E740481C1C}">
+                <a14:useLocalDpi xmlns:a14="http://schemas.microsoft.com/office/drawing/2010/main" val="0"/>
+              </a:ext>
+            </a:extLst>
+          </a:blip>
+          <a:srcRect/>
+          <a:stretch>
+            <a:fillRect/>
+          </a:stretch>
+        </p:blipFill>
+        <p:spPr bwMode="auto">
+          <a:xfrm>
+            <a:off x="470639" y="12594115"/>
+            <a:ext cx="7102152" cy="2810997"/>
+          </a:xfrm>
+          <a:prstGeom prst="rect">
+            <a:avLst/>
+          </a:prstGeom>
+          <a:noFill/>
+          <a:extLst>
+            <a:ext uri="{909E8E84-426E-40DD-AFC4-6F175D3DCCD1}">
+              <a14:hiddenFill xmlns:a14="http://schemas.microsoft.com/office/drawing/2010/main">
+                <a:solidFill>
+                  <a:srgbClr val="FFFFFF"/>
+                </a:solidFill>
+              </a14:hiddenFill>
+            </a:ext>
+          </a:extLst>
+        </p:spPr>
+      </p:pic>
+      <p:pic>
+        <p:nvPicPr>
+          <p:cNvPr id="1028" name="Picture 4" descr="https://cdn.discordapp.com/attachments/960191998462165033/961423334522896414/unknown.png"/>
+          <p:cNvPicPr>
+            <a:picLocks noChangeAspect="1" noChangeArrowheads="1"/>
+          </p:cNvPicPr>
+          <p:nvPr/>
+        </p:nvPicPr>
+        <p:blipFill>
+          <a:blip r:embed="rId13">
+            <a:extLst>
+              <a:ext uri="{28A0092B-C50C-407E-A947-70E740481C1C}">
+                <a14:useLocalDpi xmlns:a14="http://schemas.microsoft.com/office/drawing/2010/main" val="0"/>
+              </a:ext>
+            </a:extLst>
+          </a:blip>
+          <a:srcRect/>
+          <a:stretch>
+            <a:fillRect/>
+          </a:stretch>
+        </p:blipFill>
+        <p:spPr bwMode="auto">
+          <a:xfrm>
+            <a:off x="7572469" y="8680005"/>
+            <a:ext cx="7089680" cy="4034295"/>
+          </a:xfrm>
+          <a:prstGeom prst="rect">
+            <a:avLst/>
+          </a:prstGeom>
+          <a:noFill/>
+          <a:ln>
+            <a:solidFill>
+              <a:srgbClr val="FFFF00"/>
+            </a:solidFill>
+          </a:ln>
+          <a:extLst>
+            <a:ext uri="{909E8E84-426E-40DD-AFC4-6F175D3DCCD1}">
+              <a14:hiddenFill xmlns:a14="http://schemas.microsoft.com/office/drawing/2010/main">
+                <a:solidFill>
+                  <a:srgbClr val="FFFFFF"/>
+                </a:solidFill>
+              </a14:hiddenFill>
+            </a:ext>
+          </a:extLst>
+        </p:spPr>
+      </p:pic>
+      <p:sp>
+        <p:nvSpPr>
+          <p:cNvPr id="37" name="Rectangle 3"/>
+          <p:cNvSpPr>
+            <a:spLocks noChangeArrowheads="1"/>
+          </p:cNvSpPr>
+          <p:nvPr/>
+        </p:nvSpPr>
+        <p:spPr bwMode="auto">
+          <a:xfrm>
+            <a:off x="470639" y="1293163"/>
+            <a:ext cx="14204950" cy="1277938"/>
+          </a:xfrm>
+          <a:prstGeom prst="rect">
+            <a:avLst/>
+          </a:prstGeom>
+          <a:noFill/>
+          <a:ln>
+            <a:noFill/>
+          </a:ln>
+          <a:effectLst/>
+        </p:spPr>
+        <p:txBody>
+          <a:bodyPr vert="horz" wrap="square" lIns="36576" tIns="36576" rIns="36576" bIns="36576" numCol="1" anchor="ctr" anchorCtr="0" compatLnSpc="1">
+            <a:prstTxWarp prst="textNoShape">
+              <a:avLst/>
+            </a:prstTxWarp>
+          </a:bodyPr>
+          <a:lstStyle/>
+          <a:p>
+            <a:pPr algn="ctr"/>
+            <a:r>
+              <a:rPr lang="en-US" sz="5600" b="1" dirty="0" smtClean="0">
+                <a:solidFill>
+                  <a:srgbClr val="FFFF00"/>
+                </a:solidFill>
+                <a:latin typeface="Sofia Sans Cond" panose="020B0503060000020004" pitchFamily="34" charset="0"/>
+              </a:rPr>
+              <a:t>HADIS</a:t>
+            </a:r>
+            <a:r>
+              <a:rPr lang="en-US" sz="4800" b="1" dirty="0" smtClean="0">
+                <a:solidFill>
+                  <a:srgbClr val="FFFF00"/>
+                </a:solidFill>
+                <a:latin typeface="Sofia Sans Cond" panose="020B0503060000020004" pitchFamily="34" charset="0"/>
+              </a:rPr>
+              <a:t/>
+            </a:r>
+            <a:br>
+              <a:rPr lang="en-US" sz="4800" b="1" dirty="0" smtClean="0">
+                <a:solidFill>
+                  <a:srgbClr val="FFFF00"/>
+                </a:solidFill>
+                <a:latin typeface="Sofia Sans Cond" panose="020B0503060000020004" pitchFamily="34" charset="0"/>
+              </a:rPr>
+            </a:br>
+            <a:r>
+              <a:rPr lang="en-US" sz="2800" b="1" dirty="0" smtClean="0">
+                <a:solidFill>
+                  <a:srgbClr val="FFFF00"/>
+                </a:solidFill>
+                <a:latin typeface="Sofia Sans Cond" panose="020B0503060000020004" pitchFamily="34" charset="0"/>
+              </a:rPr>
+              <a:t>Hunt A Duck In Space</a:t>
+            </a:r>
+            <a:endParaRPr lang="bg-BG" sz="2800" b="1" dirty="0">
+              <a:solidFill>
+                <a:srgbClr val="FFFF00"/>
+              </a:solidFill>
+              <a:latin typeface="Sofia Sans Cond" panose="020B0503060000020004" pitchFamily="34" charset="0"/>
+            </a:endParaRPr>
+          </a:p>
+        </p:txBody>
+      </p:sp>
+      <p:pic>
+        <p:nvPicPr>
+          <p:cNvPr id="38" name="Picture 37"/>
+          <p:cNvPicPr>
+            <a:picLocks noChangeAspect="1"/>
+          </p:cNvPicPr>
+          <p:nvPr/>
+        </p:nvPicPr>
+        <p:blipFill>
+          <a:blip r:embed="rId14">
+            <a:extLst>
+              <a:ext uri="{28A0092B-C50C-407E-A947-70E740481C1C}">
+                <a14:useLocalDpi xmlns:a14="http://schemas.microsoft.com/office/drawing/2010/main" val="0"/>
+              </a:ext>
+            </a:extLst>
+          </a:blip>
+          <a:stretch>
+            <a:fillRect/>
+          </a:stretch>
+        </p:blipFill>
+        <p:spPr>
+          <a:xfrm rot="3215507">
+            <a:off x="1727123" y="19480392"/>
+            <a:ext cx="2104083" cy="1670890"/>
+          </a:xfrm>
+          <a:prstGeom prst="rect">
+            <a:avLst/>
+          </a:prstGeom>
+        </p:spPr>
+      </p:pic>
+      <p:pic>
+        <p:nvPicPr>
+          <p:cNvPr id="39" name="Picture 11" descr="Python (programming language) - Wikipedia"/>
+          <p:cNvPicPr>
+            <a:picLocks noChangeAspect="1" noChangeArrowheads="1"/>
+          </p:cNvPicPr>
+          <p:nvPr/>
+        </p:nvPicPr>
+        <p:blipFill>
+          <a:blip r:embed="rId15" cstate="print">
+            <a:extLst>
+              <a:ext uri="{28A0092B-C50C-407E-A947-70E740481C1C}">
+                <a14:useLocalDpi xmlns:a14="http://schemas.microsoft.com/office/drawing/2010/main" val="0"/>
+              </a:ext>
+            </a:extLst>
+          </a:blip>
+          <a:srcRect/>
+          <a:stretch>
+            <a:fillRect/>
+          </a:stretch>
+        </p:blipFill>
+        <p:spPr bwMode="auto">
+          <a:xfrm>
+            <a:off x="8641080" y="16638117"/>
+            <a:ext cx="2047041" cy="2047041"/>
+          </a:xfrm>
+          <a:prstGeom prst="rect">
+            <a:avLst/>
+          </a:prstGeom>
+          <a:noFill/>
+          <a:extLst>
+            <a:ext uri="{909E8E84-426E-40DD-AFC4-6F175D3DCCD1}">
+              <a14:hiddenFill xmlns:a14="http://schemas.microsoft.com/office/drawing/2010/main">
+                <a:solidFill>
+                  <a:srgbClr val="FFFFFF"/>
+                </a:solidFill>
+              </a14:hiddenFill>
+            </a:ext>
+          </a:extLst>
+        </p:spPr>
+      </p:pic>
+    </p:spTree>
+    <p:extLst>
+      <p:ext uri="{BB962C8B-B14F-4D97-AF65-F5344CB8AC3E}">
+        <p14:creationId xmlns:p14="http://schemas.microsoft.com/office/powerpoint/2010/main" val="2955724425"/>
+      </p:ext>
+    </p:extLst>
+  </p:cSld>
+  <p:clrMapOvr>
+    <a:masterClrMapping/>
+  </p:clrMapOvr>
+  <p:timing>
+    <p:tnLst>
+      <p:par>
+        <p:cTn id="1" dur="indefinite" restart="never" nodeType="tmRoot"/>
+      </p:par>
+    </p:tnLst>
+  </p:timing>
 </p:sld>
 </file>
 

</xml_diff>